<commit_message>
Add Virginia Dignum to invited speakers section
Co-Authored-By: Claude Opus 4.5 <noreply@anthropic.com>
</commit_message>
<xml_diff>
--- a/static/2026_onsite/slides/slides_combined.pptx
+++ b/static/2026_onsite/slides/slides_combined.pptx
@@ -7045,7 +7045,7 @@
               </a:defRPr>
             </a:pPr>
             <a:r>
-              <a:t>Oral Presentation 1</a:t>
+              <a:t>WMAC History and Vision</a:t>
             </a:r>
           </a:p>
         </p:txBody>
@@ -7080,7 +7080,7 @@
               </a:defRPr>
             </a:pPr>
             <a:r>
-              <a:t>Lightning Talks for Posters</a:t>
+              <a:t>Lightning Talks for Posters (30 mins)</a:t>
             </a:r>
           </a:p>
         </p:txBody>

</xml_diff>